<commit_message>
Update Model Uncertainty sharing.pptx
minor edit
</commit_message>
<xml_diff>
--- a/Model Uncertainty sharing.pptx
+++ b/Model Uncertainty sharing.pptx
@@ -207,7 +207,7 @@
           <a:p>
             <a:fld id="{7BC7986F-721D-4EDF-A06D-42C28A98A046}" type="datetimeFigureOut">
               <a:rPr lang="en-HK" smtClean="0"/>
-              <a:t>26/12/2018</a:t>
+              <a:t>27/12/2018</a:t>
             </a:fld>
             <a:endParaRPr lang="en-HK"/>
           </a:p>
@@ -617,7 +617,7 @@
           <a:p>
             <a:fld id="{22755E5F-019C-47B2-AB3D-4F397A12006E}" type="datetime1">
               <a:rPr lang="en-HK" smtClean="0"/>
-              <a:t>26/12/2018</a:t>
+              <a:t>27/12/2018</a:t>
             </a:fld>
             <a:endParaRPr lang="en-HK"/>
           </a:p>
@@ -790,7 +790,7 @@
           <a:p>
             <a:fld id="{590C6290-8F7A-46BF-9D79-5141B7DFDBA6}" type="datetime1">
               <a:rPr lang="en-HK" smtClean="0"/>
-              <a:t>26/12/2018</a:t>
+              <a:t>27/12/2018</a:t>
             </a:fld>
             <a:endParaRPr lang="en-HK"/>
           </a:p>
@@ -973,7 +973,7 @@
           <a:p>
             <a:fld id="{58ED9B6D-0CD5-4DDD-9292-10166DD8212A}" type="datetime1">
               <a:rPr lang="en-HK" smtClean="0"/>
-              <a:t>26/12/2018</a:t>
+              <a:t>27/12/2018</a:t>
             </a:fld>
             <a:endParaRPr lang="en-HK"/>
           </a:p>
@@ -1263,7 +1263,7 @@
           <a:p>
             <a:fld id="{1A8CCCB1-491B-4F3E-A44F-D351F34A9591}" type="datetime1">
               <a:rPr lang="en-HK" smtClean="0"/>
-              <a:t>26/12/2018</a:t>
+              <a:t>27/12/2018</a:t>
             </a:fld>
             <a:endParaRPr lang="en-HK"/>
           </a:p>
@@ -1474,7 +1474,7 @@
           <a:p>
             <a:fld id="{1B574644-0698-46AC-9807-15748B72E825}" type="datetime1">
               <a:rPr lang="en-HK" smtClean="0"/>
-              <a:t>26/12/2018</a:t>
+              <a:t>27/12/2018</a:t>
             </a:fld>
             <a:endParaRPr lang="en-HK"/>
           </a:p>
@@ -1820,7 +1820,7 @@
           <a:p>
             <a:fld id="{285C58B1-24E2-4345-BDB6-77A361868727}" type="datetime1">
               <a:rPr lang="en-HK" smtClean="0"/>
-              <a:t>26/12/2018</a:t>
+              <a:t>27/12/2018</a:t>
             </a:fld>
             <a:endParaRPr lang="en-HK"/>
           </a:p>
@@ -2098,7 +2098,7 @@
           <a:p>
             <a:fld id="{38DA1F52-89DC-4BA4-A759-C924D95AEB01}" type="datetime1">
               <a:rPr lang="en-HK" smtClean="0"/>
-              <a:t>26/12/2018</a:t>
+              <a:t>27/12/2018</a:t>
             </a:fld>
             <a:endParaRPr lang="en-HK"/>
           </a:p>
@@ -2480,7 +2480,7 @@
           <a:p>
             <a:fld id="{F4E75A24-3812-42A0-B716-5EA42C0984DC}" type="datetime1">
               <a:rPr lang="en-HK" smtClean="0"/>
-              <a:t>26/12/2018</a:t>
+              <a:t>27/12/2018</a:t>
             </a:fld>
             <a:endParaRPr lang="en-HK"/>
           </a:p>
@@ -2601,7 +2601,7 @@
           <a:p>
             <a:fld id="{89B7080E-1AC3-43D5-B08E-692FC42A1B13}" type="datetime1">
               <a:rPr lang="en-HK" smtClean="0"/>
-              <a:t>26/12/2018</a:t>
+              <a:t>27/12/2018</a:t>
             </a:fld>
             <a:endParaRPr lang="en-HK"/>
           </a:p>
@@ -2775,7 +2775,7 @@
           <a:p>
             <a:fld id="{99EBC1D4-5438-4D71-A3C6-E9FAAB70C57F}" type="datetime1">
               <a:rPr lang="en-HK" smtClean="0"/>
-              <a:t>26/12/2018</a:t>
+              <a:t>27/12/2018</a:t>
             </a:fld>
             <a:endParaRPr lang="en-HK"/>
           </a:p>
@@ -3132,7 +3132,7 @@
           <a:p>
             <a:fld id="{C3A1EDB6-6F24-4AF8-BD0B-1C8DAF8667C3}" type="datetime1">
               <a:rPr lang="en-HK" smtClean="0"/>
-              <a:t>26/12/2018</a:t>
+              <a:t>27/12/2018</a:t>
             </a:fld>
             <a:endParaRPr lang="en-HK"/>
           </a:p>
@@ -3326,7 +3326,7 @@
           <a:p>
             <a:fld id="{41AFCB91-0B1F-4274-811C-9A9CED63A79F}" type="datetime1">
               <a:rPr lang="en-HK" smtClean="0"/>
-              <a:t>26/12/2018</a:t>
+              <a:t>27/12/2018</a:t>
             </a:fld>
             <a:endParaRPr lang="en-HK"/>
           </a:p>
@@ -3685,7 +3685,7 @@
           <a:p>
             <a:fld id="{255B4350-5240-4BD9-A4A0-1047D20204EF}" type="datetime1">
               <a:rPr lang="en-HK" smtClean="0"/>
-              <a:t>26/12/2018</a:t>
+              <a:t>27/12/2018</a:t>
             </a:fld>
             <a:endParaRPr lang="en-HK"/>
           </a:p>
@@ -3858,7 +3858,7 @@
           <a:p>
             <a:fld id="{81DB85EE-4296-4097-8324-FF8FD1BCE5F7}" type="datetime1">
               <a:rPr lang="en-HK" smtClean="0"/>
-              <a:t>26/12/2018</a:t>
+              <a:t>27/12/2018</a:t>
             </a:fld>
             <a:endParaRPr lang="en-HK"/>
           </a:p>
@@ -4117,7 +4117,7 @@
           <a:p>
             <a:fld id="{D324DA22-5704-4B1F-88DB-DA2C89CE078B}" type="datetime1">
               <a:rPr lang="en-HK" smtClean="0"/>
-              <a:t>26/12/2018</a:t>
+              <a:t>27/12/2018</a:t>
             </a:fld>
             <a:endParaRPr lang="en-HK"/>
           </a:p>
@@ -4371,7 +4371,7 @@
           <a:p>
             <a:fld id="{FFF936C5-A8C2-454D-A421-1EF5102C323E}" type="datetime1">
               <a:rPr lang="en-HK" smtClean="0"/>
-              <a:t>26/12/2018</a:t>
+              <a:t>27/12/2018</a:t>
             </a:fld>
             <a:endParaRPr lang="en-HK"/>
           </a:p>
@@ -4606,7 +4606,7 @@
           <a:p>
             <a:fld id="{AB79E72E-FCEE-4152-91FC-4FAE9726FD21}" type="datetime1">
               <a:rPr lang="en-HK" smtClean="0"/>
-              <a:t>26/12/2018</a:t>
+              <a:t>27/12/2018</a:t>
             </a:fld>
             <a:endParaRPr lang="en-HK"/>
           </a:p>
@@ -4956,7 +4956,7 @@
           <a:p>
             <a:fld id="{8A80EE7C-95FD-4B8E-84B0-7711B7B4B53A}" type="datetime1">
               <a:rPr lang="en-HK" smtClean="0"/>
-              <a:t>26/12/2018</a:t>
+              <a:t>27/12/2018</a:t>
             </a:fld>
             <a:endParaRPr lang="en-HK"/>
           </a:p>
@@ -5077,7 +5077,7 @@
           <a:p>
             <a:fld id="{29FC8297-608B-42D4-B538-3C198027FB68}" type="datetime1">
               <a:rPr lang="en-HK" smtClean="0"/>
-              <a:t>26/12/2018</a:t>
+              <a:t>27/12/2018</a:t>
             </a:fld>
             <a:endParaRPr lang="en-HK"/>
           </a:p>
@@ -5198,7 +5198,7 @@
           <a:p>
             <a:fld id="{91A98973-C70B-43C6-9079-22963FEB780B}" type="datetime1">
               <a:rPr lang="en-HK" smtClean="0"/>
-              <a:t>26/12/2018</a:t>
+              <a:t>27/12/2018</a:t>
             </a:fld>
             <a:endParaRPr lang="en-HK"/>
           </a:p>
@@ -5485,7 +5485,7 @@
           <a:p>
             <a:fld id="{1A5CFBBA-E6A3-49C0-B627-7A93C9AAB3EC}" type="datetime1">
               <a:rPr lang="en-HK" smtClean="0"/>
-              <a:t>26/12/2018</a:t>
+              <a:t>27/12/2018</a:t>
             </a:fld>
             <a:endParaRPr lang="en-HK"/>
           </a:p>
@@ -5752,7 +5752,7 @@
           <a:p>
             <a:fld id="{58344E19-CE0F-4A3B-B413-1143668C6429}" type="datetime1">
               <a:rPr lang="en-HK" smtClean="0"/>
-              <a:t>26/12/2018</a:t>
+              <a:t>27/12/2018</a:t>
             </a:fld>
             <a:endParaRPr lang="en-HK"/>
           </a:p>
@@ -5969,7 +5969,7 @@
           <a:p>
             <a:fld id="{D2C30EE2-2944-48AC-99D6-6C802A54B233}" type="datetime1">
               <a:rPr lang="en-HK" smtClean="0"/>
-              <a:t>26/12/2018</a:t>
+              <a:t>27/12/2018</a:t>
             </a:fld>
             <a:endParaRPr lang="en-HK"/>
           </a:p>
@@ -6576,7 +6576,7 @@
           <a:p>
             <a:fld id="{C559BEA5-0E12-46D5-8A76-B2AB6DB15F3A}" type="datetime1">
               <a:rPr lang="en-HK" smtClean="0"/>
-              <a:t>26/12/2018</a:t>
+              <a:t>27/12/2018</a:t>
             </a:fld>
             <a:endParaRPr lang="en-HK"/>
           </a:p>
@@ -8076,98 +8076,230 @@
           </a:p>
         </p:txBody>
       </p:sp>
-      <p:sp>
-        <p:nvSpPr>
-          <p:cNvPr id="3" name="內容版面配置區 2">
-            <a:extLst>
-              <a:ext uri="{FF2B5EF4-FFF2-40B4-BE49-F238E27FC236}">
-                <a16:creationId xmlns:a16="http://schemas.microsoft.com/office/drawing/2014/main" id="{C82903F8-BDC7-413C-9A45-B883F325412F}"/>
-              </a:ext>
-            </a:extLst>
-          </p:cNvPr>
-          <p:cNvSpPr>
-            <a:spLocks noGrp="1"/>
-          </p:cNvSpPr>
-          <p:nvPr>
-            <p:ph idx="1"/>
-          </p:nvPr>
-        </p:nvSpPr>
-        <p:spPr/>
-        <p:txBody>
-          <a:bodyPr>
-            <a:normAutofit fontScale="85000" lnSpcReduction="20000"/>
-          </a:bodyPr>
-          <a:lstStyle/>
-          <a:p>
-            <a:endParaRPr lang="en-HK" dirty="0"/>
-          </a:p>
-          <a:p>
-            <a:r>
-              <a:rPr lang="en-HK" dirty="0"/>
-              <a:t>Non-Bayesian:                                                Bayesian:</a:t>
-            </a:r>
-          </a:p>
-          <a:p>
-            <a:endParaRPr lang="en-HK" dirty="0"/>
-          </a:p>
-          <a:p>
-            <a:endParaRPr lang="en-HK" dirty="0"/>
-          </a:p>
-          <a:p>
-            <a:endParaRPr lang="en-HK" dirty="0"/>
-          </a:p>
-          <a:p>
-            <a:endParaRPr lang="en-HK" dirty="0"/>
-          </a:p>
-          <a:p>
-            <a:endParaRPr lang="en-HK" dirty="0"/>
-          </a:p>
-          <a:p>
-            <a:r>
-              <a:rPr lang="en-HK" dirty="0"/>
-              <a:t>Similarity/Difference</a:t>
-            </a:r>
-          </a:p>
-          <a:p>
-            <a:pPr>
-              <a:buFont typeface="Arial" panose="020B0604020202020204" pitchFamily="34" charset="0"/>
-              <a:buChar char="•"/>
-            </a:pPr>
-            <a:r>
-              <a:rPr lang="en-HK" dirty="0"/>
-              <a:t> L = Loss function </a:t>
-            </a:r>
-            <a:r>
-              <a:rPr lang="en-HK" dirty="0">
-                <a:sym typeface="Wingdings" panose="05000000000000000000" pitchFamily="2" charset="2"/>
-              </a:rPr>
-              <a:t>&lt;-&gt; Likelihood</a:t>
-            </a:r>
-          </a:p>
-          <a:p>
-            <a:pPr>
-              <a:buFont typeface="Arial" panose="020B0604020202020204" pitchFamily="34" charset="0"/>
-              <a:buChar char="•"/>
-            </a:pPr>
-            <a:r>
-              <a:rPr lang="en-HK" dirty="0">
-                <a:sym typeface="Wingdings" panose="05000000000000000000" pitchFamily="2" charset="2"/>
-              </a:rPr>
-              <a:t> C = Complexity &lt;-&gt; Prior</a:t>
-            </a:r>
-          </a:p>
-          <a:p>
-            <a:pPr>
-              <a:buFont typeface="Arial" panose="020B0604020202020204" pitchFamily="34" charset="0"/>
-              <a:buChar char="•"/>
-            </a:pPr>
-            <a:r>
-              <a:rPr lang="en-HK" dirty="0"/>
-              <a:t> Point estimates vs Distributions</a:t>
-            </a:r>
-          </a:p>
-        </p:txBody>
-      </p:sp>
+      <mc:AlternateContent xmlns:mc="http://schemas.openxmlformats.org/markup-compatibility/2006">
+        <mc:Choice xmlns:a14="http://schemas.microsoft.com/office/drawing/2010/main" Requires="a14">
+          <p:sp>
+            <p:nvSpPr>
+              <p:cNvPr id="3" name="內容版面配置區 2">
+                <a:extLst>
+                  <a:ext uri="{FF2B5EF4-FFF2-40B4-BE49-F238E27FC236}">
+                    <a16:creationId xmlns:a16="http://schemas.microsoft.com/office/drawing/2014/main" id="{C82903F8-BDC7-413C-9A45-B883F325412F}"/>
+                  </a:ext>
+                </a:extLst>
+              </p:cNvPr>
+              <p:cNvSpPr>
+                <a:spLocks noGrp="1"/>
+              </p:cNvSpPr>
+              <p:nvPr>
+                <p:ph idx="1"/>
+              </p:nvPr>
+            </p:nvSpPr>
+            <p:spPr/>
+            <p:txBody>
+              <a:bodyPr>
+                <a:normAutofit fontScale="85000" lnSpcReduction="20000"/>
+              </a:bodyPr>
+              <a:lstStyle/>
+              <a:p>
+                <a:endParaRPr lang="en-HK" dirty="0"/>
+              </a:p>
+              <a:p>
+                <a:r>
+                  <a:rPr lang="en-HK" dirty="0"/>
+                  <a:t>Non-Bayesian:                                                Bayesian:</a:t>
+                </a:r>
+              </a:p>
+              <a:p>
+                <a:endParaRPr lang="en-HK" dirty="0"/>
+              </a:p>
+              <a:p>
+                <a:endParaRPr lang="en-HK" dirty="0"/>
+              </a:p>
+              <a:p>
+                <a:endParaRPr lang="en-HK" dirty="0"/>
+              </a:p>
+              <a:p>
+                <a:endParaRPr lang="en-HK" dirty="0"/>
+              </a:p>
+              <a:p>
+                <a:endParaRPr lang="en-HK" dirty="0"/>
+              </a:p>
+              <a:p>
+                <a:r>
+                  <a:rPr lang="en-HK" dirty="0"/>
+                  <a:t>Similarity/Difference</a:t>
+                </a:r>
+              </a:p>
+              <a:p>
+                <a:pPr>
+                  <a:buFont typeface="Arial" panose="020B0604020202020204" pitchFamily="34" charset="0"/>
+                  <a:buChar char="•"/>
+                </a:pPr>
+                <a:r>
+                  <a:rPr lang="en-HK" dirty="0"/>
+                  <a:t> L = Loss function </a:t>
+                </a:r>
+                <a:r>
+                  <a:rPr lang="en-HK" dirty="0">
+                    <a:sym typeface="Wingdings" panose="05000000000000000000" pitchFamily="2" charset="2"/>
+                  </a:rPr>
+                  <a:t>&lt;-&gt; Likelihood</a:t>
+                </a:r>
+              </a:p>
+              <a:p>
+                <a:pPr>
+                  <a:buFont typeface="Arial" panose="020B0604020202020204" pitchFamily="34" charset="0"/>
+                  <a:buChar char="•"/>
+                </a:pPr>
+                <a:r>
+                  <a:rPr lang="en-HK" dirty="0">
+                    <a:sym typeface="Wingdings" panose="05000000000000000000" pitchFamily="2" charset="2"/>
+                  </a:rPr>
+                  <a:t> C = Complexity &lt;-&gt; Prior</a:t>
+                </a:r>
+              </a:p>
+              <a:p>
+                <a:pPr>
+                  <a:buFont typeface="Arial" panose="020B0604020202020204" pitchFamily="34" charset="0"/>
+                  <a:buChar char="•"/>
+                </a:pPr>
+                <a:r>
+                  <a:rPr lang="en-HK" dirty="0"/>
+                  <a:t> Point estimates (</a:t>
+                </a:r>
+                <a14:m>
+                  <m:oMath xmlns:m="http://schemas.openxmlformats.org/officeDocument/2006/math">
+                    <m:sSup>
+                      <m:sSupPr>
+                        <m:ctrlPr>
+                          <a:rPr lang="en-HK" i="1">
+                            <a:latin typeface="Cambria Math" panose="02040503050406030204" pitchFamily="18" charset="0"/>
+                          </a:rPr>
+                        </m:ctrlPr>
+                      </m:sSupPr>
+                      <m:e>
+                        <m:r>
+                          <a:rPr lang="en-HK" i="1">
+                            <a:latin typeface="Cambria Math" panose="02040503050406030204" pitchFamily="18" charset="0"/>
+                          </a:rPr>
+                          <m:t>𝑤</m:t>
+                        </m:r>
+                      </m:e>
+                      <m:sup>
+                        <m:r>
+                          <a:rPr lang="en-HK" i="1">
+                            <a:latin typeface="Cambria Math" panose="02040503050406030204" pitchFamily="18" charset="0"/>
+                          </a:rPr>
+                          <m:t>′</m:t>
+                        </m:r>
+                      </m:sup>
+                    </m:sSup>
+                  </m:oMath>
+                </a14:m>
+                <a:r>
+                  <a:rPr lang="en-HK" dirty="0"/>
+                  <a:t>) vs Distributions (</a:t>
+                </a:r>
+                <a14:m>
+                  <m:oMath xmlns:m="http://schemas.openxmlformats.org/officeDocument/2006/math">
+                    <m:r>
+                      <a:rPr lang="en-US" b="0" i="1" smtClean="0">
+                        <a:latin typeface="Cambria Math" panose="02040503050406030204" pitchFamily="18" charset="0"/>
+                      </a:rPr>
+                      <m:t>𝑝</m:t>
+                    </m:r>
+                    <m:r>
+                      <a:rPr lang="en-US" b="0" i="1" smtClean="0">
+                        <a:latin typeface="Cambria Math" panose="02040503050406030204" pitchFamily="18" charset="0"/>
+                      </a:rPr>
+                      <m:t>(</m:t>
+                    </m:r>
+                    <m:r>
+                      <a:rPr lang="en-US" b="0" i="1" smtClean="0">
+                        <a:latin typeface="Cambria Math" panose="02040503050406030204" pitchFamily="18" charset="0"/>
+                      </a:rPr>
+                      <m:t>𝑤</m:t>
+                    </m:r>
+                    <m:r>
+                      <a:rPr lang="en-US" b="0" i="1" smtClean="0">
+                        <a:latin typeface="Cambria Math" panose="02040503050406030204" pitchFamily="18" charset="0"/>
+                      </a:rPr>
+                      <m:t>|</m:t>
+                    </m:r>
+                    <m:r>
+                      <a:rPr lang="en-US" b="0" i="1" smtClean="0">
+                        <a:latin typeface="Cambria Math" panose="02040503050406030204" pitchFamily="18" charset="0"/>
+                      </a:rPr>
+                      <m:t>𝑋</m:t>
+                    </m:r>
+                    <m:r>
+                      <a:rPr lang="en-US" b="0" i="1" smtClean="0">
+                        <a:latin typeface="Cambria Math" panose="02040503050406030204" pitchFamily="18" charset="0"/>
+                      </a:rPr>
+                      <m:t>,</m:t>
+                    </m:r>
+                    <m:r>
+                      <a:rPr lang="en-US" b="0" i="1" smtClean="0">
+                        <a:latin typeface="Cambria Math" panose="02040503050406030204" pitchFamily="18" charset="0"/>
+                      </a:rPr>
+                      <m:t>𝑦</m:t>
+                    </m:r>
+                    <m:r>
+                      <a:rPr lang="en-US" b="0" i="1" smtClean="0">
+                        <a:latin typeface="Cambria Math" panose="02040503050406030204" pitchFamily="18" charset="0"/>
+                      </a:rPr>
+                      <m:t>)</m:t>
+                    </m:r>
+                  </m:oMath>
+                </a14:m>
+                <a:r>
+                  <a:rPr lang="en-HK" dirty="0"/>
+                  <a:t>)</a:t>
+                </a:r>
+              </a:p>
+            </p:txBody>
+          </p:sp>
+        </mc:Choice>
+        <mc:Fallback>
+          <p:sp>
+            <p:nvSpPr>
+              <p:cNvPr id="3" name="內容版面配置區 2">
+                <a:extLst>
+                  <a:ext uri="{FF2B5EF4-FFF2-40B4-BE49-F238E27FC236}">
+                    <a16:creationId xmlns:a16="http://schemas.microsoft.com/office/drawing/2014/main" id="{C82903F8-BDC7-413C-9A45-B883F325412F}"/>
+                  </a:ext>
+                </a:extLst>
+              </p:cNvPr>
+              <p:cNvSpPr>
+                <a:spLocks noGrp="1" noRot="1" noChangeAspect="1" noMove="1" noResize="1" noEditPoints="1" noAdjustHandles="1" noChangeArrowheads="1" noChangeShapeType="1" noTextEdit="1"/>
+              </p:cNvSpPr>
+              <p:nvPr>
+                <p:ph idx="1"/>
+              </p:nvPr>
+            </p:nvSpPr>
+            <p:spPr>
+              <a:blipFill>
+                <a:blip r:embed="rId2"/>
+                <a:stretch>
+                  <a:fillRect l="-1212"/>
+                </a:stretch>
+              </a:blipFill>
+            </p:spPr>
+            <p:txBody>
+              <a:bodyPr/>
+              <a:lstStyle/>
+              <a:p>
+                <a:r>
+                  <a:rPr lang="en-US">
+                    <a:noFill/>
+                  </a:rPr>
+                  <a:t> </a:t>
+                </a:r>
+              </a:p>
+            </p:txBody>
+          </p:sp>
+        </mc:Fallback>
+      </mc:AlternateContent>
       <p:pic>
         <p:nvPicPr>
           <p:cNvPr id="4" name="圖片 3">
@@ -8183,7 +8315,7 @@
           <p:nvPr/>
         </p:nvPicPr>
         <p:blipFill>
-          <a:blip r:embed="rId2"/>
+          <a:blip r:embed="rId3"/>
           <a:stretch>
             <a:fillRect/>
           </a:stretch>
@@ -8541,7 +8673,7 @@
                 <a:avLst/>
               </a:prstGeom>
               <a:blipFill>
-                <a:blip r:embed="rId3"/>
+                <a:blip r:embed="rId4"/>
                 <a:stretch>
                   <a:fillRect l="-169"/>
                 </a:stretch>

</xml_diff>